<commit_message>
Tweaks from class six
</commit_message>
<xml_diff>
--- a/slides/classsix/slides.pptx
+++ b/slides/classsix/slides.pptx
@@ -5,28 +5,30 @@
     <p:sldMasterId id="2147483660" r:id="rId1"/>
   </p:sldMasterIdLst>
   <p:notesMasterIdLst>
-    <p:notesMasterId r:id="rId21"/>
+    <p:notesMasterId r:id="rId23"/>
   </p:notesMasterIdLst>
   <p:sldIdLst>
     <p:sldId id="256" r:id="rId2"/>
     <p:sldId id="257" r:id="rId3"/>
     <p:sldId id="342" r:id="rId4"/>
-    <p:sldId id="258" r:id="rId5"/>
-    <p:sldId id="259" r:id="rId6"/>
-    <p:sldId id="312" r:id="rId7"/>
-    <p:sldId id="388" r:id="rId8"/>
-    <p:sldId id="389" r:id="rId9"/>
-    <p:sldId id="390" r:id="rId10"/>
-    <p:sldId id="391" r:id="rId11"/>
-    <p:sldId id="393" r:id="rId12"/>
-    <p:sldId id="392" r:id="rId13"/>
-    <p:sldId id="394" r:id="rId14"/>
-    <p:sldId id="395" r:id="rId15"/>
-    <p:sldId id="268" r:id="rId16"/>
-    <p:sldId id="384" r:id="rId17"/>
-    <p:sldId id="385" r:id="rId18"/>
-    <p:sldId id="386" r:id="rId19"/>
-    <p:sldId id="267" r:id="rId20"/>
+    <p:sldId id="397" r:id="rId5"/>
+    <p:sldId id="396" r:id="rId6"/>
+    <p:sldId id="258" r:id="rId7"/>
+    <p:sldId id="259" r:id="rId8"/>
+    <p:sldId id="312" r:id="rId9"/>
+    <p:sldId id="388" r:id="rId10"/>
+    <p:sldId id="389" r:id="rId11"/>
+    <p:sldId id="390" r:id="rId12"/>
+    <p:sldId id="391" r:id="rId13"/>
+    <p:sldId id="393" r:id="rId14"/>
+    <p:sldId id="392" r:id="rId15"/>
+    <p:sldId id="394" r:id="rId16"/>
+    <p:sldId id="395" r:id="rId17"/>
+    <p:sldId id="268" r:id="rId18"/>
+    <p:sldId id="384" r:id="rId19"/>
+    <p:sldId id="385" r:id="rId20"/>
+    <p:sldId id="386" r:id="rId21"/>
+    <p:sldId id="267" r:id="rId22"/>
   </p:sldIdLst>
   <p:sldSz cx="9144000" cy="6858000" type="screen4x3"/>
   <p:notesSz cx="6858000" cy="9144000"/>
@@ -210,7 +212,7 @@
           <a:p>
             <a:fld id="{9B5D41C8-0A92-DD47-AB00-F0EFFD66679B}" type="datetimeFigureOut">
               <a:rPr lang="en-US" smtClean="0"/>
-              <a:t>10/16/11</a:t>
+              <a:t>10/21/11</a:t>
             </a:fld>
             <a:endParaRPr lang="en-US"/>
           </a:p>
@@ -635,7 +637,7 @@
           <a:p>
             <a:fld id="{F0AB357A-3C6D-9E43-AB07-807CDFEA83A0}" type="slidenum">
               <a:rPr lang="en-US" smtClean="0"/>
-              <a:t>4</a:t>
+              <a:t>6</a:t>
             </a:fld>
             <a:endParaRPr lang="en-US"/>
           </a:p>
@@ -731,7 +733,7 @@
           <a:p>
             <a:fld id="{F0AB357A-3C6D-9E43-AB07-807CDFEA83A0}" type="slidenum">
               <a:rPr lang="en-US" smtClean="0"/>
-              <a:t>5</a:t>
+              <a:t>7</a:t>
             </a:fld>
             <a:endParaRPr lang="en-US"/>
           </a:p>
@@ -819,7 +821,7 @@
           <a:p>
             <a:fld id="{F0AB357A-3C6D-9E43-AB07-807CDFEA83A0}" type="slidenum">
               <a:rPr lang="en-US" smtClean="0"/>
-              <a:t>6</a:t>
+              <a:t>8</a:t>
             </a:fld>
             <a:endParaRPr lang="en-US"/>
           </a:p>
@@ -907,7 +909,7 @@
           <a:p>
             <a:fld id="{F0AB357A-3C6D-9E43-AB07-807CDFEA83A0}" type="slidenum">
               <a:rPr lang="en-US" smtClean="0"/>
-              <a:t>14</a:t>
+              <a:t>16</a:t>
             </a:fld>
             <a:endParaRPr lang="en-US"/>
           </a:p>
@@ -995,7 +997,7 @@
           <a:p>
             <a:fld id="{F0AB357A-3C6D-9E43-AB07-807CDFEA83A0}" type="slidenum">
               <a:rPr lang="en-US" smtClean="0"/>
-              <a:t>15</a:t>
+              <a:t>17</a:t>
             </a:fld>
             <a:endParaRPr lang="en-US"/>
           </a:p>
@@ -1091,7 +1093,7 @@
           <a:p>
             <a:fld id="{F0AB357A-3C6D-9E43-AB07-807CDFEA83A0}" type="slidenum">
               <a:rPr lang="en-US" smtClean="0"/>
-              <a:t>19</a:t>
+              <a:t>21</a:t>
             </a:fld>
             <a:endParaRPr lang="en-US"/>
           </a:p>
@@ -1738,7 +1740,7 @@
             <a:fld id="{B7C3F878-F5E8-489B-AC8A-64F2A7E22C28}" type="datetimeFigureOut">
               <a:rPr lang="en-US" smtClean="0"/>
               <a:pPr/>
-              <a:t>10/16/11</a:t>
+              <a:t>10/21/11</a:t>
             </a:fld>
             <a:endParaRPr lang="en-US"/>
           </a:p>
@@ -1945,7 +1947,7 @@
             <a:fld id="{B7C3F878-F5E8-489B-AC8A-64F2A7E22C28}" type="datetimeFigureOut">
               <a:rPr lang="en-US" smtClean="0"/>
               <a:pPr/>
-              <a:t>10/16/11</a:t>
+              <a:t>10/21/11</a:t>
             </a:fld>
             <a:endParaRPr lang="en-US"/>
           </a:p>
@@ -2152,7 +2154,7 @@
             <a:fld id="{B7C3F878-F5E8-489B-AC8A-64F2A7E22C28}" type="datetimeFigureOut">
               <a:rPr lang="en-US" smtClean="0"/>
               <a:pPr/>
-              <a:t>10/16/11</a:t>
+              <a:t>10/21/11</a:t>
             </a:fld>
             <a:endParaRPr lang="en-US"/>
           </a:p>
@@ -2345,7 +2347,7 @@
             <a:fld id="{B7C3F878-F5E8-489B-AC8A-64F2A7E22C28}" type="datetimeFigureOut">
               <a:rPr lang="en-US" smtClean="0"/>
               <a:pPr/>
-              <a:t>10/16/11</a:t>
+              <a:t>10/21/11</a:t>
             </a:fld>
             <a:endParaRPr lang="en-US"/>
           </a:p>
@@ -2586,7 +2588,7 @@
             <a:fld id="{B7C3F878-F5E8-489B-AC8A-64F2A7E22C28}" type="datetimeFigureOut">
               <a:rPr lang="en-US" smtClean="0"/>
               <a:pPr/>
-              <a:t>10/16/11</a:t>
+              <a:t>10/21/11</a:t>
             </a:fld>
             <a:endParaRPr lang="en-US"/>
           </a:p>
@@ -2701,7 +2703,7 @@
             <a:fld id="{B7C3F878-F5E8-489B-AC8A-64F2A7E22C28}" type="datetimeFigureOut">
               <a:rPr lang="en-US" smtClean="0"/>
               <a:pPr/>
-              <a:t>10/16/11</a:t>
+              <a:t>10/21/11</a:t>
             </a:fld>
             <a:endParaRPr lang="en-US"/>
           </a:p>
@@ -3133,7 +3135,7 @@
             <a:fld id="{B7C3F878-F5E8-489B-AC8A-64F2A7E22C28}" type="datetimeFigureOut">
               <a:rPr lang="en-US" smtClean="0"/>
               <a:pPr/>
-              <a:t>10/16/11</a:t>
+              <a:t>10/21/11</a:t>
             </a:fld>
             <a:endParaRPr lang="en-US"/>
           </a:p>
@@ -3414,7 +3416,7 @@
             <a:fld id="{B7C3F878-F5E8-489B-AC8A-64F2A7E22C28}" type="datetimeFigureOut">
               <a:rPr lang="en-US" smtClean="0"/>
               <a:pPr/>
-              <a:t>10/16/11</a:t>
+              <a:t>10/21/11</a:t>
             </a:fld>
             <a:endParaRPr lang="en-US"/>
           </a:p>
@@ -3506,7 +3508,7 @@
             <a:fld id="{B7C3F878-F5E8-489B-AC8A-64F2A7E22C28}" type="datetimeFigureOut">
               <a:rPr lang="en-US" smtClean="0"/>
               <a:pPr/>
-              <a:t>10/16/11</a:t>
+              <a:t>10/21/11</a:t>
             </a:fld>
             <a:endParaRPr lang="en-US"/>
           </a:p>
@@ -4345,7 +4347,7 @@
             <a:fld id="{B7C3F878-F5E8-489B-AC8A-64F2A7E22C28}" type="datetimeFigureOut">
               <a:rPr lang="en-US" smtClean="0"/>
               <a:pPr/>
-              <a:t>10/16/11</a:t>
+              <a:t>10/21/11</a:t>
             </a:fld>
             <a:endParaRPr lang="en-US"/>
           </a:p>
@@ -5178,7 +5180,7 @@
             <a:fld id="{B7C3F878-F5E8-489B-AC8A-64F2A7E22C28}" type="datetimeFigureOut">
               <a:rPr lang="en-US" smtClean="0"/>
               <a:pPr/>
-              <a:t>10/16/11</a:t>
+              <a:t>10/21/11</a:t>
             </a:fld>
             <a:endParaRPr lang="en-US"/>
           </a:p>
@@ -5834,7 +5836,7 @@
             <a:fld id="{B7C3F878-F5E8-489B-AC8A-64F2A7E22C28}" type="datetimeFigureOut">
               <a:rPr lang="en-US" smtClean="0"/>
               <a:pPr/>
-              <a:t>10/16/11</a:t>
+              <a:t>10/21/11</a:t>
             </a:fld>
             <a:endParaRPr lang="en-US" dirty="0"/>
           </a:p>
@@ -6334,8 +6336,8 @@
           <a:lstStyle/>
           <a:p>
             <a:r>
-              <a:rPr lang="en-US" dirty="0" smtClean="0"/>
-              <a:t>Layout and Design (Part I)</a:t>
+              <a:rPr lang="en-US" dirty="0"/>
+              <a:t>Organizing Your Site (Part II)</a:t>
             </a:r>
             <a:endParaRPr lang="en-US" dirty="0"/>
           </a:p>
@@ -6395,7 +6397,7 @@
           <a:p>
             <a:r>
               <a:rPr lang="en-US" dirty="0" smtClean="0"/>
-              <a:t>Eric Meyer's Reset</a:t>
+              <a:t>What is a framework?</a:t>
             </a:r>
             <a:endParaRPr lang="en-US" dirty="0"/>
           </a:p>
@@ -6417,42 +6419,32 @@
           <a:lstStyle/>
           <a:p>
             <a:r>
-              <a:rPr lang="en-US" dirty="0" smtClean="0">
-                <a:hlinkClick r:id="rId2"/>
-              </a:rPr>
-              <a:t>http://meyerweb.com/eric/tools/css/reset</a:t>
-            </a:r>
-            <a:r>
-              <a:rPr lang="en-US" dirty="0" smtClean="0">
-                <a:hlinkClick r:id="rId2"/>
-              </a:rPr>
-              <a:t>/</a:t>
-            </a:r>
-            <a:endParaRPr lang="en-US" dirty="0" smtClean="0"/>
-          </a:p>
-          <a:p>
-            <a:r>
-              <a:rPr lang="en-US" dirty="0" smtClean="0"/>
-              <a:t>Fixes differences in web browsers</a:t>
-            </a:r>
-          </a:p>
-          <a:p>
-            <a:r>
-              <a:rPr lang="en-US" dirty="0" smtClean="0"/>
-              <a:t>Removes all default browser properties</a:t>
-            </a:r>
-          </a:p>
-          <a:p>
-            <a:r>
-              <a:rPr lang="en-US" dirty="0" smtClean="0"/>
-              <a:t>Starting point, not end-all-be-all</a:t>
-            </a:r>
-            <a:endParaRPr lang="en-US" dirty="0" smtClean="0"/>
-          </a:p>
-          <a:p>
-            <a:r>
-              <a:rPr lang="en-US" dirty="0" smtClean="0"/>
-              <a:t>Example</a:t>
+              <a:rPr lang="en-US" dirty="0" smtClean="0"/>
+              <a:t>A tool that makes writing code easier</a:t>
+            </a:r>
+          </a:p>
+          <a:p>
+            <a:r>
+              <a:rPr lang="en-US" dirty="0" smtClean="0"/>
+              <a:t>Frameworks are available for all languages</a:t>
+            </a:r>
+          </a:p>
+          <a:p>
+            <a:r>
+              <a:rPr lang="en-US" dirty="0" smtClean="0"/>
+              <a:t>Can add new features</a:t>
+            </a:r>
+          </a:p>
+          <a:p>
+            <a:r>
+              <a:rPr lang="en-US" dirty="0" smtClean="0"/>
+              <a:t>Can fix bugs or strange behavior</a:t>
+            </a:r>
+          </a:p>
+          <a:p>
+            <a:r>
+              <a:rPr lang="en-US" dirty="0" smtClean="0"/>
+              <a:t>Can make it into a whole new language</a:t>
             </a:r>
             <a:endParaRPr lang="en-US" dirty="0"/>
           </a:p>
@@ -6461,13 +6453,20 @@
     </p:spTree>
     <p:extLst>
       <p:ext uri="{BB962C8B-B14F-4D97-AF65-F5344CB8AC3E}">
-        <p14:creationId xmlns:p14="http://schemas.microsoft.com/office/powerpoint/2010/main" val="1395862678"/>
+        <p14:creationId xmlns:p14="http://schemas.microsoft.com/office/powerpoint/2010/main" val="1077609855"/>
       </p:ext>
     </p:extLst>
   </p:cSld>
   <p:clrMapOvr>
     <a:masterClrMapping/>
   </p:clrMapOvr>
+  <p:timing>
+    <p:tnLst>
+      <p:par>
+        <p:cTn xmlns:p14="http://schemas.microsoft.com/office/powerpoint/2010/main" id="1" dur="indefinite" restart="never" nodeType="tmRoot"/>
+      </p:par>
+    </p:tnLst>
+  </p:timing>
 </p:sld>
 </file>
 
@@ -6505,7 +6504,7 @@
           <a:p>
             <a:r>
               <a:rPr lang="en-US" dirty="0" smtClean="0"/>
-              <a:t>960 Grid System</a:t>
+              <a:t>CSS Frameworks</a:t>
             </a:r>
             <a:endParaRPr lang="en-US" dirty="0"/>
           </a:p>
@@ -6527,35 +6526,14 @@
           <a:lstStyle/>
           <a:p>
             <a:r>
-              <a:rPr lang="en-US" dirty="0" smtClean="0">
-                <a:hlinkClick r:id="rId2"/>
-              </a:rPr>
-              <a:t>http://960.gs</a:t>
-            </a:r>
-            <a:r>
-              <a:rPr lang="en-US" dirty="0" smtClean="0">
-                <a:hlinkClick r:id="rId2"/>
-              </a:rPr>
-              <a:t>/</a:t>
-            </a:r>
-            <a:endParaRPr lang="en-US" dirty="0" smtClean="0"/>
-          </a:p>
-          <a:p>
-            <a:r>
-              <a:rPr lang="en-US" dirty="0" smtClean="0"/>
-              <a:t>Gives you a grid for your layout</a:t>
-            </a:r>
-          </a:p>
-          <a:p>
-            <a:r>
-              <a:rPr lang="en-US" dirty="0" smtClean="0"/>
-              <a:t>12 or 16 columns, 960 pixels total</a:t>
-            </a:r>
-          </a:p>
-          <a:p>
-            <a:r>
-              <a:rPr lang="en-US" dirty="0" smtClean="0"/>
-              <a:t>CSS reset</a:t>
+              <a:rPr lang="en-US" dirty="0" smtClean="0"/>
+              <a:t>Fix browser differences</a:t>
+            </a:r>
+          </a:p>
+          <a:p>
+            <a:r>
+              <a:rPr lang="en-US" dirty="0" smtClean="0"/>
+              <a:t>Better layout control</a:t>
             </a:r>
           </a:p>
           <a:p>
@@ -6567,16 +6545,21 @@
           <a:p>
             <a:r>
               <a:rPr lang="en-US" dirty="0" smtClean="0"/>
-              <a:t>Example</a:t>
-            </a:r>
-            <a:endParaRPr lang="en-US" dirty="0"/>
+              <a:t>Form styling</a:t>
+            </a:r>
+          </a:p>
+          <a:p>
+            <a:r>
+              <a:rPr lang="en-US" dirty="0" smtClean="0"/>
+              <a:t>Print styles</a:t>
+            </a:r>
           </a:p>
         </p:txBody>
       </p:sp>
     </p:spTree>
     <p:extLst>
       <p:ext uri="{BB962C8B-B14F-4D97-AF65-F5344CB8AC3E}">
-        <p14:creationId xmlns:p14="http://schemas.microsoft.com/office/powerpoint/2010/main" val="4064204455"/>
+        <p14:creationId xmlns:p14="http://schemas.microsoft.com/office/powerpoint/2010/main" val="1773065251"/>
       </p:ext>
     </p:extLst>
   </p:cSld>
@@ -6620,7 +6603,7 @@
           <a:p>
             <a:r>
               <a:rPr lang="en-US" dirty="0" smtClean="0"/>
-              <a:t>Blueprint</a:t>
+              <a:t>Eric Meyer's Reset</a:t>
             </a:r>
             <a:endParaRPr lang="en-US" dirty="0"/>
           </a:p>
@@ -6638,71 +6621,33 @@
         </p:nvSpPr>
         <p:spPr/>
         <p:txBody>
-          <a:bodyPr>
-            <a:normAutofit lnSpcReduction="10000"/>
-          </a:bodyPr>
+          <a:bodyPr/>
           <a:lstStyle/>
           <a:p>
             <a:r>
               <a:rPr lang="en-US" dirty="0" smtClean="0">
                 <a:hlinkClick r:id="rId2"/>
               </a:rPr>
-              <a:t>http://www.blueprintcss.org</a:t>
-            </a:r>
-            <a:r>
-              <a:rPr lang="en-US" dirty="0" smtClean="0">
-                <a:hlinkClick r:id="rId2"/>
-              </a:rPr>
-              <a:t>/</a:t>
+              <a:t>http://meyerweb.com/eric/tools/css/reset/</a:t>
             </a:r>
             <a:endParaRPr lang="en-US" dirty="0" smtClean="0"/>
           </a:p>
           <a:p>
             <a:r>
               <a:rPr lang="en-US" dirty="0" smtClean="0"/>
-              <a:t>Has a lot of features:</a:t>
-            </a:r>
-          </a:p>
-          <a:p>
-            <a:pPr lvl="1"/>
-            <a:r>
-              <a:rPr lang="en-US" dirty="0" smtClean="0"/>
-              <a:t>CSS reset</a:t>
-            </a:r>
-          </a:p>
-          <a:p>
-            <a:pPr lvl="1"/>
-            <a:r>
-              <a:rPr lang="en-US" dirty="0" smtClean="0"/>
-              <a:t>Grid layout</a:t>
-            </a:r>
-          </a:p>
-          <a:p>
-            <a:pPr lvl="1"/>
-            <a:r>
-              <a:rPr lang="en-US" dirty="0" smtClean="0"/>
-              <a:t>Typography</a:t>
-            </a:r>
-          </a:p>
-          <a:p>
-            <a:pPr lvl="1"/>
-            <a:r>
-              <a:rPr lang="en-US" dirty="0" smtClean="0"/>
-              <a:t>Form styles</a:t>
-            </a:r>
-          </a:p>
-          <a:p>
-            <a:pPr lvl="1"/>
-            <a:r>
-              <a:rPr lang="en-US" dirty="0" smtClean="0"/>
-              <a:t>Print styles</a:t>
-            </a:r>
-          </a:p>
-          <a:p>
-            <a:pPr lvl="1"/>
-            <a:r>
-              <a:rPr lang="en-US" dirty="0" smtClean="0"/>
-              <a:t>Other plugins</a:t>
+              <a:t>Fixes differences in web browsers</a:t>
+            </a:r>
+          </a:p>
+          <a:p>
+            <a:r>
+              <a:rPr lang="en-US" dirty="0" smtClean="0"/>
+              <a:t>Removes all default browser properties</a:t>
+            </a:r>
+          </a:p>
+          <a:p>
+            <a:r>
+              <a:rPr lang="en-US" dirty="0" smtClean="0"/>
+              <a:t>Starting point, not end-all-be-all</a:t>
             </a:r>
           </a:p>
           <a:p>
@@ -6710,13 +6655,14 @@
               <a:rPr lang="en-US" dirty="0" smtClean="0"/>
               <a:t>Example</a:t>
             </a:r>
+            <a:endParaRPr lang="en-US" dirty="0"/>
           </a:p>
         </p:txBody>
       </p:sp>
     </p:spTree>
     <p:extLst>
       <p:ext uri="{BB962C8B-B14F-4D97-AF65-F5344CB8AC3E}">
-        <p14:creationId xmlns:p14="http://schemas.microsoft.com/office/powerpoint/2010/main" val="3380375683"/>
+        <p14:creationId xmlns:p14="http://schemas.microsoft.com/office/powerpoint/2010/main" val="1395862678"/>
       </p:ext>
     </p:extLst>
   </p:cSld>
@@ -6760,11 +6706,7 @@
           <a:p>
             <a:r>
               <a:rPr lang="en-US" dirty="0" smtClean="0"/>
-              <a:t>Class Five </a:t>
-            </a:r>
-            <a:r>
-              <a:rPr lang="en-US" dirty="0" smtClean="0"/>
-              <a:t>Assignment</a:t>
+              <a:t>960 Grid System</a:t>
             </a:r>
             <a:endParaRPr lang="en-US" dirty="0"/>
           </a:p>
@@ -6789,74 +6731,47 @@
               <a:rPr lang="en-US" dirty="0" smtClean="0">
                 <a:hlinkClick r:id="rId2"/>
               </a:rPr>
-              <a:t>Storyb</a:t>
-            </a:r>
-            <a:r>
-              <a:rPr lang="en-US" dirty="0" smtClean="0">
-                <a:hlinkClick r:id="rId2"/>
-              </a:rPr>
-              <a:t>oard 1</a:t>
+              <a:t>http://960.gs/</a:t>
             </a:r>
             <a:endParaRPr lang="en-US" dirty="0" smtClean="0"/>
           </a:p>
           <a:p>
-            <a:pPr lvl="1"/>
-            <a:r>
-              <a:rPr lang="en-US" dirty="0" smtClean="0"/>
-              <a:t>Let's do it by hand</a:t>
-            </a:r>
-          </a:p>
-          <a:p>
-            <a:pPr lvl="1"/>
-            <a:r>
-              <a:rPr lang="en-US" dirty="0" smtClean="0"/>
-              <a:t>Let's use Blueprint</a:t>
-            </a:r>
-          </a:p>
-          <a:p>
-            <a:pPr lvl="1"/>
-            <a:r>
-              <a:rPr lang="en-US" dirty="0" smtClean="0"/>
-              <a:t>Let's use 960</a:t>
-            </a:r>
-          </a:p>
-          <a:p>
-            <a:r>
-              <a:rPr lang="en-US" dirty="0" smtClean="0">
-                <a:hlinkClick r:id="rId3"/>
-              </a:rPr>
-              <a:t>Storyboard 2</a:t>
-            </a:r>
-            <a:endParaRPr lang="en-US" dirty="0" smtClean="0"/>
-          </a:p>
-          <a:p>
-            <a:pPr lvl="1"/>
-            <a:r>
-              <a:rPr lang="en-US" dirty="0" smtClean="0"/>
-              <a:t>Let's do it by hand</a:t>
-            </a:r>
-          </a:p>
-          <a:p>
-            <a:pPr lvl="1"/>
-            <a:r>
-              <a:rPr lang="en-US" dirty="0" smtClean="0"/>
-              <a:t>Let's use Blueprint</a:t>
-            </a:r>
-          </a:p>
-          <a:p>
-            <a:pPr lvl="1"/>
-            <a:r>
-              <a:rPr lang="en-US" dirty="0" smtClean="0"/>
-              <a:t>Let's use 960</a:t>
-            </a:r>
-            <a:endParaRPr lang="en-US" dirty="0" smtClean="0"/>
+            <a:r>
+              <a:rPr lang="en-US" dirty="0" smtClean="0"/>
+              <a:t>Gives you a grid for your layout</a:t>
+            </a:r>
+          </a:p>
+          <a:p>
+            <a:r>
+              <a:rPr lang="en-US" dirty="0" smtClean="0"/>
+              <a:t>12 or 16 columns, 960 pixels total</a:t>
+            </a:r>
+          </a:p>
+          <a:p>
+            <a:r>
+              <a:rPr lang="en-US" dirty="0" smtClean="0"/>
+              <a:t>CSS reset</a:t>
+            </a:r>
+          </a:p>
+          <a:p>
+            <a:r>
+              <a:rPr lang="en-US" dirty="0" smtClean="0"/>
+              <a:t>Typography</a:t>
+            </a:r>
+          </a:p>
+          <a:p>
+            <a:r>
+              <a:rPr lang="en-US" dirty="0" smtClean="0"/>
+              <a:t>Example</a:t>
+            </a:r>
+            <a:endParaRPr lang="en-US" dirty="0"/>
           </a:p>
         </p:txBody>
       </p:sp>
     </p:spTree>
     <p:extLst>
       <p:ext uri="{BB962C8B-B14F-4D97-AF65-F5344CB8AC3E}">
-        <p14:creationId xmlns:p14="http://schemas.microsoft.com/office/powerpoint/2010/main" val="3226837404"/>
+        <p14:creationId xmlns:p14="http://schemas.microsoft.com/office/powerpoint/2010/main" val="4064204455"/>
       </p:ext>
     </p:extLst>
   </p:cSld>
@@ -6885,6 +6800,269 @@
       </p:grpSpPr>
       <p:sp>
         <p:nvSpPr>
+          <p:cNvPr id="2" name="Title 1"/>
+          <p:cNvSpPr>
+            <a:spLocks noGrp="1"/>
+          </p:cNvSpPr>
+          <p:nvPr>
+            <p:ph type="title"/>
+          </p:nvPr>
+        </p:nvSpPr>
+        <p:spPr/>
+        <p:txBody>
+          <a:bodyPr/>
+          <a:lstStyle/>
+          <a:p>
+            <a:r>
+              <a:rPr lang="en-US" dirty="0" smtClean="0"/>
+              <a:t>Blueprint</a:t>
+            </a:r>
+            <a:endParaRPr lang="en-US" dirty="0"/>
+          </a:p>
+        </p:txBody>
+      </p:sp>
+      <p:sp>
+        <p:nvSpPr>
+          <p:cNvPr id="3" name="Content Placeholder 2"/>
+          <p:cNvSpPr>
+            <a:spLocks noGrp="1"/>
+          </p:cNvSpPr>
+          <p:nvPr>
+            <p:ph idx="1"/>
+          </p:nvPr>
+        </p:nvSpPr>
+        <p:spPr/>
+        <p:txBody>
+          <a:bodyPr>
+            <a:normAutofit lnSpcReduction="10000"/>
+          </a:bodyPr>
+          <a:lstStyle/>
+          <a:p>
+            <a:r>
+              <a:rPr lang="en-US" dirty="0" smtClean="0">
+                <a:hlinkClick r:id="rId2"/>
+              </a:rPr>
+              <a:t>http://www.blueprintcss.org/</a:t>
+            </a:r>
+            <a:endParaRPr lang="en-US" dirty="0" smtClean="0"/>
+          </a:p>
+          <a:p>
+            <a:r>
+              <a:rPr lang="en-US" dirty="0" smtClean="0"/>
+              <a:t>Has a lot of features:</a:t>
+            </a:r>
+          </a:p>
+          <a:p>
+            <a:pPr lvl="1"/>
+            <a:r>
+              <a:rPr lang="en-US" dirty="0" smtClean="0"/>
+              <a:t>CSS reset</a:t>
+            </a:r>
+          </a:p>
+          <a:p>
+            <a:pPr lvl="1"/>
+            <a:r>
+              <a:rPr lang="en-US" dirty="0" smtClean="0"/>
+              <a:t>Grid layout</a:t>
+            </a:r>
+          </a:p>
+          <a:p>
+            <a:pPr lvl="1"/>
+            <a:r>
+              <a:rPr lang="en-US" dirty="0" smtClean="0"/>
+              <a:t>Typography</a:t>
+            </a:r>
+          </a:p>
+          <a:p>
+            <a:pPr lvl="1"/>
+            <a:r>
+              <a:rPr lang="en-US" dirty="0" smtClean="0"/>
+              <a:t>Form styles</a:t>
+            </a:r>
+          </a:p>
+          <a:p>
+            <a:pPr lvl="1"/>
+            <a:r>
+              <a:rPr lang="en-US" dirty="0" smtClean="0"/>
+              <a:t>Print styles</a:t>
+            </a:r>
+          </a:p>
+          <a:p>
+            <a:pPr lvl="1"/>
+            <a:r>
+              <a:rPr lang="en-US" dirty="0" smtClean="0"/>
+              <a:t>Other plugins</a:t>
+            </a:r>
+          </a:p>
+          <a:p>
+            <a:r>
+              <a:rPr lang="en-US" dirty="0" smtClean="0"/>
+              <a:t>Example</a:t>
+            </a:r>
+          </a:p>
+        </p:txBody>
+      </p:sp>
+    </p:spTree>
+    <p:extLst>
+      <p:ext uri="{BB962C8B-B14F-4D97-AF65-F5344CB8AC3E}">
+        <p14:creationId xmlns:p14="http://schemas.microsoft.com/office/powerpoint/2010/main" val="3380375683"/>
+      </p:ext>
+    </p:extLst>
+  </p:cSld>
+  <p:clrMapOvr>
+    <a:masterClrMapping/>
+  </p:clrMapOvr>
+</p:sld>
+</file>
+
+<file path=ppt/slides/slide15.xml><?xml version="1.0" encoding="utf-8"?>
+<p:sld xmlns:a="http://schemas.openxmlformats.org/drawingml/2006/main" xmlns:r="http://schemas.openxmlformats.org/officeDocument/2006/relationships" xmlns:p="http://schemas.openxmlformats.org/presentationml/2006/main">
+  <p:cSld>
+    <p:spTree>
+      <p:nvGrpSpPr>
+        <p:cNvPr id="1" name=""/>
+        <p:cNvGrpSpPr/>
+        <p:nvPr/>
+      </p:nvGrpSpPr>
+      <p:grpSpPr>
+        <a:xfrm>
+          <a:off x="0" y="0"/>
+          <a:ext cx="0" cy="0"/>
+          <a:chOff x="0" y="0"/>
+          <a:chExt cx="0" cy="0"/>
+        </a:xfrm>
+      </p:grpSpPr>
+      <p:sp>
+        <p:nvSpPr>
+          <p:cNvPr id="2" name="Title 1"/>
+          <p:cNvSpPr>
+            <a:spLocks noGrp="1"/>
+          </p:cNvSpPr>
+          <p:nvPr>
+            <p:ph type="title"/>
+          </p:nvPr>
+        </p:nvSpPr>
+        <p:spPr/>
+        <p:txBody>
+          <a:bodyPr/>
+          <a:lstStyle/>
+          <a:p>
+            <a:r>
+              <a:rPr lang="en-US" dirty="0" smtClean="0"/>
+              <a:t>Class Five Assignment</a:t>
+            </a:r>
+            <a:endParaRPr lang="en-US" dirty="0"/>
+          </a:p>
+        </p:txBody>
+      </p:sp>
+      <p:sp>
+        <p:nvSpPr>
+          <p:cNvPr id="3" name="Content Placeholder 2"/>
+          <p:cNvSpPr>
+            <a:spLocks noGrp="1"/>
+          </p:cNvSpPr>
+          <p:nvPr>
+            <p:ph idx="1"/>
+          </p:nvPr>
+        </p:nvSpPr>
+        <p:spPr/>
+        <p:txBody>
+          <a:bodyPr/>
+          <a:lstStyle/>
+          <a:p>
+            <a:r>
+              <a:rPr lang="en-US" dirty="0" smtClean="0">
+                <a:hlinkClick r:id="rId2"/>
+              </a:rPr>
+              <a:t>Storyboard 1</a:t>
+            </a:r>
+            <a:endParaRPr lang="en-US" dirty="0" smtClean="0"/>
+          </a:p>
+          <a:p>
+            <a:pPr lvl="1"/>
+            <a:r>
+              <a:rPr lang="en-US" dirty="0" smtClean="0"/>
+              <a:t>Let's do it by hand</a:t>
+            </a:r>
+          </a:p>
+          <a:p>
+            <a:pPr lvl="1"/>
+            <a:r>
+              <a:rPr lang="en-US" dirty="0" smtClean="0"/>
+              <a:t>Let's use Blueprint</a:t>
+            </a:r>
+          </a:p>
+          <a:p>
+            <a:pPr lvl="1"/>
+            <a:r>
+              <a:rPr lang="en-US" dirty="0" smtClean="0"/>
+              <a:t>Let's use 960</a:t>
+            </a:r>
+          </a:p>
+          <a:p>
+            <a:r>
+              <a:rPr lang="en-US" dirty="0" smtClean="0">
+                <a:hlinkClick r:id="rId3"/>
+              </a:rPr>
+              <a:t>Storyboard 2</a:t>
+            </a:r>
+            <a:endParaRPr lang="en-US" dirty="0" smtClean="0"/>
+          </a:p>
+          <a:p>
+            <a:pPr lvl="1"/>
+            <a:r>
+              <a:rPr lang="en-US" dirty="0" smtClean="0"/>
+              <a:t>Let's do it by hand</a:t>
+            </a:r>
+          </a:p>
+          <a:p>
+            <a:pPr lvl="1"/>
+            <a:r>
+              <a:rPr lang="en-US" dirty="0" smtClean="0"/>
+              <a:t>Let's use Blueprint</a:t>
+            </a:r>
+          </a:p>
+          <a:p>
+            <a:pPr lvl="1"/>
+            <a:r>
+              <a:rPr lang="en-US" dirty="0" smtClean="0"/>
+              <a:t>Let's use 960</a:t>
+            </a:r>
+          </a:p>
+        </p:txBody>
+      </p:sp>
+    </p:spTree>
+    <p:extLst>
+      <p:ext uri="{BB962C8B-B14F-4D97-AF65-F5344CB8AC3E}">
+        <p14:creationId xmlns:p14="http://schemas.microsoft.com/office/powerpoint/2010/main" val="3226837404"/>
+      </p:ext>
+    </p:extLst>
+  </p:cSld>
+  <p:clrMapOvr>
+    <a:masterClrMapping/>
+  </p:clrMapOvr>
+</p:sld>
+</file>
+
+<file path=ppt/slides/slide16.xml><?xml version="1.0" encoding="utf-8"?>
+<p:sld xmlns:a="http://schemas.openxmlformats.org/drawingml/2006/main" xmlns:r="http://schemas.openxmlformats.org/officeDocument/2006/relationships" xmlns:p="http://schemas.openxmlformats.org/presentationml/2006/main">
+  <p:cSld>
+    <p:spTree>
+      <p:nvGrpSpPr>
+        <p:cNvPr id="1" name=""/>
+        <p:cNvGrpSpPr/>
+        <p:nvPr/>
+      </p:nvGrpSpPr>
+      <p:grpSpPr>
+        <a:xfrm>
+          <a:off x="0" y="0"/>
+          <a:ext cx="0" cy="0"/>
+          <a:chOff x="0" y="0"/>
+          <a:chExt cx="0" cy="0"/>
+        </a:xfrm>
+      </p:grpSpPr>
+      <p:sp>
+        <p:nvSpPr>
           <p:cNvPr id="3" name="Title 2"/>
           <p:cNvSpPr>
             <a:spLocks noGrp="1"/>
@@ -6945,7 +7123,7 @@
 </p:sld>
 </file>
 
-<file path=ppt/slides/slide15.xml><?xml version="1.0" encoding="utf-8"?>
+<file path=ppt/slides/slide17.xml><?xml version="1.0" encoding="utf-8"?>
 <p:sld xmlns:a="http://schemas.openxmlformats.org/drawingml/2006/main" xmlns:r="http://schemas.openxmlformats.org/officeDocument/2006/relationships" xmlns:p="http://schemas.openxmlformats.org/presentationml/2006/main">
   <p:cSld>
     <p:spTree>
@@ -7028,213 +7206,6 @@
 </p:sld>
 </file>
 
-<file path=ppt/slides/slide16.xml><?xml version="1.0" encoding="utf-8"?>
-<p:sld xmlns:a="http://schemas.openxmlformats.org/drawingml/2006/main" xmlns:r="http://schemas.openxmlformats.org/officeDocument/2006/relationships" xmlns:p="http://schemas.openxmlformats.org/presentationml/2006/main">
-  <p:cSld>
-    <p:spTree>
-      <p:nvGrpSpPr>
-        <p:cNvPr id="1" name=""/>
-        <p:cNvGrpSpPr/>
-        <p:nvPr/>
-      </p:nvGrpSpPr>
-      <p:grpSpPr>
-        <a:xfrm>
-          <a:off x="0" y="0"/>
-          <a:ext cx="0" cy="0"/>
-          <a:chOff x="0" y="0"/>
-          <a:chExt cx="0" cy="0"/>
-        </a:xfrm>
-      </p:grpSpPr>
-      <p:sp>
-        <p:nvSpPr>
-          <p:cNvPr id="2" name="Title 1"/>
-          <p:cNvSpPr>
-            <a:spLocks noGrp="1"/>
-          </p:cNvSpPr>
-          <p:nvPr>
-            <p:ph type="title"/>
-          </p:nvPr>
-        </p:nvSpPr>
-        <p:spPr/>
-        <p:txBody>
-          <a:bodyPr/>
-          <a:lstStyle/>
-          <a:p>
-            <a:r>
-              <a:rPr lang="en-US" dirty="0" smtClean="0"/>
-              <a:t>Create Folder Structure</a:t>
-            </a:r>
-            <a:endParaRPr lang="en-US" dirty="0"/>
-          </a:p>
-        </p:txBody>
-      </p:sp>
-      <p:sp>
-        <p:nvSpPr>
-          <p:cNvPr id="3" name="Content Placeholder 2"/>
-          <p:cNvSpPr>
-            <a:spLocks noGrp="1"/>
-          </p:cNvSpPr>
-          <p:nvPr>
-            <p:ph idx="1"/>
-          </p:nvPr>
-        </p:nvSpPr>
-        <p:spPr/>
-        <p:txBody>
-          <a:bodyPr/>
-          <a:lstStyle/>
-          <a:p>
-            <a:r>
-              <a:rPr lang="en-US" dirty="0" smtClean="0"/>
-              <a:t>Create folder for your website</a:t>
-            </a:r>
-          </a:p>
-          <a:p>
-            <a:r>
-              <a:rPr lang="en-US" dirty="0" smtClean="0"/>
-              <a:t>Create folders for </a:t>
-            </a:r>
-            <a:r>
-              <a:rPr lang="en-US" dirty="0" err="1" smtClean="0"/>
-              <a:t>stylesheets</a:t>
-            </a:r>
-            <a:r>
-              <a:rPr lang="en-US" dirty="0" smtClean="0"/>
-              <a:t>, images</a:t>
-            </a:r>
-          </a:p>
-          <a:p>
-            <a:r>
-              <a:rPr lang="en-US" dirty="0" smtClean="0"/>
-              <a:t>Create </a:t>
-            </a:r>
-            <a:r>
-              <a:rPr lang="en-US" dirty="0" err="1" smtClean="0"/>
-              <a:t>index.html</a:t>
-            </a:r>
-            <a:r>
-              <a:rPr lang="en-US" dirty="0" smtClean="0"/>
-              <a:t> for homepage</a:t>
-            </a:r>
-          </a:p>
-          <a:p>
-            <a:r>
-              <a:rPr lang="en-US" dirty="0"/>
-              <a:t>Create </a:t>
-            </a:r>
-            <a:r>
-              <a:rPr lang="en-US" dirty="0" err="1"/>
-              <a:t>screen.css</a:t>
-            </a:r>
-            <a:endParaRPr lang="en-US" dirty="0"/>
-          </a:p>
-          <a:p>
-            <a:r>
-              <a:rPr lang="en-US" dirty="0" smtClean="0"/>
-              <a:t>Create folders to match your IA</a:t>
-            </a:r>
-          </a:p>
-          <a:p>
-            <a:r>
-              <a:rPr lang="en-US" dirty="0" smtClean="0"/>
-              <a:t>Create </a:t>
-            </a:r>
-            <a:r>
-              <a:rPr lang="en-US" dirty="0" err="1" smtClean="0"/>
-              <a:t>index.html</a:t>
-            </a:r>
-            <a:r>
-              <a:rPr lang="en-US" dirty="0" smtClean="0"/>
-              <a:t> files for each page in IA</a:t>
-            </a:r>
-            <a:endParaRPr lang="en-US" dirty="0"/>
-          </a:p>
-        </p:txBody>
-      </p:sp>
-    </p:spTree>
-    <p:extLst>
-      <p:ext uri="{BB962C8B-B14F-4D97-AF65-F5344CB8AC3E}">
-        <p14:creationId xmlns:p14="http://schemas.microsoft.com/office/powerpoint/2010/main" val="1546313665"/>
-      </p:ext>
-    </p:extLst>
-  </p:cSld>
-  <p:clrMapOvr>
-    <a:masterClrMapping/>
-  </p:clrMapOvr>
-</p:sld>
-</file>
-
-<file path=ppt/slides/slide17.xml><?xml version="1.0" encoding="utf-8"?>
-<p:sld xmlns:a="http://schemas.openxmlformats.org/drawingml/2006/main" xmlns:r="http://schemas.openxmlformats.org/officeDocument/2006/relationships" xmlns:p="http://schemas.openxmlformats.org/presentationml/2006/main">
-  <p:cSld>
-    <p:spTree>
-      <p:nvGrpSpPr>
-        <p:cNvPr id="1" name=""/>
-        <p:cNvGrpSpPr/>
-        <p:nvPr/>
-      </p:nvGrpSpPr>
-      <p:grpSpPr>
-        <a:xfrm>
-          <a:off x="0" y="0"/>
-          <a:ext cx="0" cy="0"/>
-          <a:chOff x="0" y="0"/>
-          <a:chExt cx="0" cy="0"/>
-        </a:xfrm>
-      </p:grpSpPr>
-      <p:sp>
-        <p:nvSpPr>
-          <p:cNvPr id="2" name="Title 1"/>
-          <p:cNvSpPr>
-            <a:spLocks noGrp="1"/>
-          </p:cNvSpPr>
-          <p:nvPr>
-            <p:ph type="title"/>
-          </p:nvPr>
-        </p:nvSpPr>
-        <p:spPr/>
-        <p:txBody>
-          <a:bodyPr/>
-          <a:lstStyle/>
-          <a:p>
-            <a:r>
-              <a:rPr lang="en-US" dirty="0" smtClean="0"/>
-              <a:t>Example</a:t>
-            </a:r>
-            <a:endParaRPr lang="en-US" dirty="0"/>
-          </a:p>
-        </p:txBody>
-      </p:sp>
-      <p:sp>
-        <p:nvSpPr>
-          <p:cNvPr id="3" name="Content Placeholder 2"/>
-          <p:cNvSpPr>
-            <a:spLocks noGrp="1"/>
-          </p:cNvSpPr>
-          <p:nvPr>
-            <p:ph idx="1"/>
-          </p:nvPr>
-        </p:nvSpPr>
-        <p:spPr/>
-        <p:txBody>
-          <a:bodyPr/>
-          <a:lstStyle/>
-          <a:p>
-            <a:endParaRPr lang="en-US"/>
-          </a:p>
-        </p:txBody>
-      </p:sp>
-    </p:spTree>
-    <p:extLst>
-      <p:ext uri="{BB962C8B-B14F-4D97-AF65-F5344CB8AC3E}">
-        <p14:creationId xmlns:p14="http://schemas.microsoft.com/office/powerpoint/2010/main" val="4176477782"/>
-      </p:ext>
-    </p:extLst>
-  </p:cSld>
-  <p:clrMapOvr>
-    <a:masterClrMapping/>
-  </p:clrMapOvr>
-</p:sld>
-</file>
-
 <file path=ppt/slides/slide18.xml><?xml version="1.0" encoding="utf-8"?>
 <p:sld xmlns:a="http://schemas.openxmlformats.org/drawingml/2006/main" xmlns:r="http://schemas.openxmlformats.org/officeDocument/2006/relationships" xmlns:p="http://schemas.openxmlformats.org/presentationml/2006/main">
   <p:cSld>
@@ -7269,7 +7240,7 @@
           <a:p>
             <a:r>
               <a:rPr lang="en-US" dirty="0" smtClean="0"/>
-              <a:t>Review</a:t>
+              <a:t>Create Folder Structure</a:t>
             </a:r>
             <a:endParaRPr lang="en-US" dirty="0"/>
           </a:p>
@@ -7290,73 +7261,68 @@
           <a:bodyPr/>
           <a:lstStyle/>
           <a:p>
-            <a:pPr marL="457200" indent="-457200">
-              <a:buFont typeface="+mj-lt"/>
-              <a:buAutoNum type="arabicPeriod"/>
-            </a:pPr>
-            <a:r>
-              <a:rPr lang="en-US" dirty="0" smtClean="0"/>
-              <a:t>Gather content</a:t>
-            </a:r>
-          </a:p>
-          <a:p>
-            <a:pPr marL="457200" indent="-457200">
-              <a:buFont typeface="+mj-lt"/>
-              <a:buAutoNum type="arabicPeriod"/>
-            </a:pPr>
-            <a:r>
-              <a:rPr lang="en-US" dirty="0" smtClean="0"/>
-              <a:t>Brainstorm a theme and visual metaphor</a:t>
-            </a:r>
-          </a:p>
-          <a:p>
-            <a:pPr marL="457200" indent="-457200">
-              <a:buFont typeface="+mj-lt"/>
-              <a:buAutoNum type="arabicPeriod"/>
-            </a:pPr>
-            <a:r>
-              <a:rPr lang="en-US" dirty="0" smtClean="0"/>
-              <a:t>Develop visual metaphor, layout, color scheme</a:t>
-            </a:r>
-          </a:p>
-          <a:p>
-            <a:pPr marL="457200" indent="-457200">
-              <a:buFont typeface="+mj-lt"/>
-              <a:buAutoNum type="arabicPeriod"/>
-            </a:pPr>
-            <a:r>
-              <a:rPr lang="en-US" dirty="0" smtClean="0"/>
-              <a:t>Build a storyboard on paper</a:t>
-            </a:r>
-          </a:p>
-          <a:p>
-            <a:pPr marL="457200" indent="-457200">
-              <a:buFont typeface="+mj-lt"/>
-              <a:buAutoNum type="arabicPeriod"/>
-            </a:pPr>
-            <a:r>
-              <a:rPr lang="en-US" dirty="0" smtClean="0"/>
-              <a:t>Card sort</a:t>
-            </a:r>
-          </a:p>
-          <a:p>
-            <a:pPr marL="457200" indent="-457200">
-              <a:buFont typeface="+mj-lt"/>
-              <a:buAutoNum type="arabicPeriod"/>
-            </a:pPr>
-            <a:r>
-              <a:rPr lang="en-US" dirty="0" smtClean="0"/>
-              <a:t>Markup your content</a:t>
-            </a:r>
-          </a:p>
-          <a:p>
-            <a:pPr marL="457200" indent="-457200">
-              <a:buFont typeface="+mj-lt"/>
-              <a:buAutoNum type="arabicPeriod"/>
-            </a:pPr>
-            <a:r>
-              <a:rPr lang="en-US" dirty="0" smtClean="0"/>
-              <a:t>Style your content</a:t>
+            <a:r>
+              <a:rPr lang="en-US" dirty="0" smtClean="0"/>
+              <a:t>Create folder for your website</a:t>
+            </a:r>
+          </a:p>
+          <a:p>
+            <a:r>
+              <a:rPr lang="en-US" dirty="0" smtClean="0"/>
+              <a:t>Create folders for </a:t>
+            </a:r>
+            <a:r>
+              <a:rPr lang="en-US" dirty="0" err="1" smtClean="0"/>
+              <a:t>stylesheets</a:t>
+            </a:r>
+            <a:r>
+              <a:rPr lang="en-US" dirty="0" smtClean="0"/>
+              <a:t>, images</a:t>
+            </a:r>
+          </a:p>
+          <a:p>
+            <a:r>
+              <a:rPr lang="en-US" dirty="0" smtClean="0"/>
+              <a:t>Create </a:t>
+            </a:r>
+            <a:r>
+              <a:rPr lang="en-US" dirty="0" err="1" smtClean="0"/>
+              <a:t>index.html</a:t>
+            </a:r>
+            <a:r>
+              <a:rPr lang="en-US" dirty="0" smtClean="0"/>
+              <a:t> for homepage</a:t>
+            </a:r>
+          </a:p>
+          <a:p>
+            <a:r>
+              <a:rPr lang="en-US" dirty="0"/>
+              <a:t>Create </a:t>
+            </a:r>
+            <a:r>
+              <a:rPr lang="en-US" dirty="0" err="1"/>
+              <a:t>screen.css</a:t>
+            </a:r>
+            <a:endParaRPr lang="en-US" dirty="0"/>
+          </a:p>
+          <a:p>
+            <a:r>
+              <a:rPr lang="en-US" dirty="0" smtClean="0"/>
+              <a:t>Create folders to match your IA</a:t>
+            </a:r>
+          </a:p>
+          <a:p>
+            <a:r>
+              <a:rPr lang="en-US" dirty="0" smtClean="0"/>
+              <a:t>Create </a:t>
+            </a:r>
+            <a:r>
+              <a:rPr lang="en-US" dirty="0" err="1" smtClean="0"/>
+              <a:t>index.html</a:t>
+            </a:r>
+            <a:r>
+              <a:rPr lang="en-US" dirty="0" smtClean="0"/>
+              <a:t> files for each page in IA</a:t>
             </a:r>
             <a:endParaRPr lang="en-US" dirty="0"/>
           </a:p>
@@ -7365,7 +7331,7 @@
     </p:spTree>
     <p:extLst>
       <p:ext uri="{BB962C8B-B14F-4D97-AF65-F5344CB8AC3E}">
-        <p14:creationId xmlns:p14="http://schemas.microsoft.com/office/powerpoint/2010/main" val="1644293927"/>
+        <p14:creationId xmlns:p14="http://schemas.microsoft.com/office/powerpoint/2010/main" val="1546313665"/>
       </p:ext>
     </p:extLst>
   </p:cSld>
@@ -7394,7 +7360,7 @@
       </p:grpSpPr>
       <p:sp>
         <p:nvSpPr>
-          <p:cNvPr id="9" name="Title 8"/>
+          <p:cNvPr id="2" name="Title 1"/>
           <p:cNvSpPr>
             <a:spLocks noGrp="1"/>
           </p:cNvSpPr>
@@ -7409,7 +7375,7 @@
           <a:p>
             <a:r>
               <a:rPr lang="en-US" dirty="0" smtClean="0"/>
-              <a:t>Class Seven</a:t>
+              <a:t>Example</a:t>
             </a:r>
             <a:endParaRPr lang="en-US" dirty="0"/>
           </a:p>
@@ -7417,93 +7383,33 @@
       </p:sp>
       <p:sp>
         <p:nvSpPr>
-          <p:cNvPr id="10" name="Text Placeholder 9"/>
-          <p:cNvSpPr>
-            <a:spLocks noGrp="1"/>
-          </p:cNvSpPr>
-          <p:nvPr>
-            <p:ph type="body" idx="1"/>
-          </p:nvPr>
-        </p:nvSpPr>
-        <p:spPr/>
-        <p:txBody>
-          <a:bodyPr/>
-          <a:lstStyle/>
-          <a:p>
-            <a:r>
-              <a:rPr lang="en-US" dirty="0" smtClean="0"/>
-              <a:t>Layout and Design (Part </a:t>
-            </a:r>
-            <a:r>
-              <a:rPr lang="en-US" dirty="0" smtClean="0"/>
-              <a:t>II</a:t>
-            </a:r>
-            <a:r>
-              <a:rPr lang="en-US" dirty="0" smtClean="0"/>
-              <a:t>)</a:t>
-            </a:r>
-            <a:endParaRPr lang="en-US" dirty="0"/>
-          </a:p>
-        </p:txBody>
-      </p:sp>
-      <p:sp>
-        <p:nvSpPr>
-          <p:cNvPr id="11" name="Footer Placeholder 10"/>
-          <p:cNvSpPr>
-            <a:spLocks noGrp="1"/>
-          </p:cNvSpPr>
-          <p:nvPr>
-            <p:ph type="ftr" sz="quarter" idx="11"/>
-          </p:nvPr>
-        </p:nvSpPr>
-        <p:spPr/>
-        <p:txBody>
-          <a:bodyPr/>
-          <a:lstStyle/>
-          <a:p>
-            <a:r>
-              <a:rPr lang="en-US" dirty="0"/>
-              <a:t>Assignment: Read Chapter 4 </a:t>
-            </a:r>
-            <a:r>
-              <a:rPr lang="da-DK" dirty="0"/>
-              <a:t>(pages 128 – 157)</a:t>
-            </a:r>
-            <a:r>
-              <a:rPr lang="en-US" dirty="0" smtClean="0"/>
-              <a:t>,</a:t>
-            </a:r>
-            <a:endParaRPr lang="en-US" dirty="0" smtClean="0"/>
-          </a:p>
-          <a:p>
-            <a:r>
-              <a:rPr lang="en-US" dirty="0" smtClean="0"/>
-              <a:t>markup </a:t>
-            </a:r>
-            <a:r>
-              <a:rPr lang="en-US" dirty="0"/>
-              <a:t>your homepage</a:t>
-            </a:r>
+          <p:cNvPr id="3" name="Content Placeholder 2"/>
+          <p:cNvSpPr>
+            <a:spLocks noGrp="1"/>
+          </p:cNvSpPr>
+          <p:nvPr>
+            <p:ph idx="1"/>
+          </p:nvPr>
+        </p:nvSpPr>
+        <p:spPr/>
+        <p:txBody>
+          <a:bodyPr/>
+          <a:lstStyle/>
+          <a:p>
+            <a:endParaRPr lang="en-US"/>
           </a:p>
         </p:txBody>
       </p:sp>
     </p:spTree>
     <p:extLst>
       <p:ext uri="{BB962C8B-B14F-4D97-AF65-F5344CB8AC3E}">
-        <p14:creationId xmlns:p14="http://schemas.microsoft.com/office/powerpoint/2010/main" val="472547524"/>
+        <p14:creationId xmlns:p14="http://schemas.microsoft.com/office/powerpoint/2010/main" val="4176477782"/>
       </p:ext>
     </p:extLst>
   </p:cSld>
   <p:clrMapOvr>
     <a:masterClrMapping/>
   </p:clrMapOvr>
-  <p:timing>
-    <p:tnLst>
-      <p:par>
-        <p:cTn xmlns:p14="http://schemas.microsoft.com/office/powerpoint/2010/main" id="1" dur="indefinite" restart="never" nodeType="tmRoot"/>
-      </p:par>
-    </p:tnLst>
-  </p:timing>
 </p:sld>
 </file>
 
@@ -7626,6 +7532,278 @@
     <p:extLst>
       <p:ext uri="{BB962C8B-B14F-4D97-AF65-F5344CB8AC3E}">
         <p14:creationId xmlns:p14="http://schemas.microsoft.com/office/powerpoint/2010/main" val="3889961293"/>
+      </p:ext>
+    </p:extLst>
+  </p:cSld>
+  <p:clrMapOvr>
+    <a:masterClrMapping/>
+  </p:clrMapOvr>
+  <p:timing>
+    <p:tnLst>
+      <p:par>
+        <p:cTn xmlns:p14="http://schemas.microsoft.com/office/powerpoint/2010/main" id="1" dur="indefinite" restart="never" nodeType="tmRoot"/>
+      </p:par>
+    </p:tnLst>
+  </p:timing>
+</p:sld>
+</file>
+
+<file path=ppt/slides/slide20.xml><?xml version="1.0" encoding="utf-8"?>
+<p:sld xmlns:a="http://schemas.openxmlformats.org/drawingml/2006/main" xmlns:r="http://schemas.openxmlformats.org/officeDocument/2006/relationships" xmlns:p="http://schemas.openxmlformats.org/presentationml/2006/main">
+  <p:cSld>
+    <p:spTree>
+      <p:nvGrpSpPr>
+        <p:cNvPr id="1" name=""/>
+        <p:cNvGrpSpPr/>
+        <p:nvPr/>
+      </p:nvGrpSpPr>
+      <p:grpSpPr>
+        <a:xfrm>
+          <a:off x="0" y="0"/>
+          <a:ext cx="0" cy="0"/>
+          <a:chOff x="0" y="0"/>
+          <a:chExt cx="0" cy="0"/>
+        </a:xfrm>
+      </p:grpSpPr>
+      <p:sp>
+        <p:nvSpPr>
+          <p:cNvPr id="2" name="Title 1"/>
+          <p:cNvSpPr>
+            <a:spLocks noGrp="1"/>
+          </p:cNvSpPr>
+          <p:nvPr>
+            <p:ph type="title"/>
+          </p:nvPr>
+        </p:nvSpPr>
+        <p:spPr/>
+        <p:txBody>
+          <a:bodyPr/>
+          <a:lstStyle/>
+          <a:p>
+            <a:r>
+              <a:rPr lang="en-US" dirty="0" smtClean="0"/>
+              <a:t>Review</a:t>
+            </a:r>
+            <a:endParaRPr lang="en-US" dirty="0"/>
+          </a:p>
+        </p:txBody>
+      </p:sp>
+      <p:sp>
+        <p:nvSpPr>
+          <p:cNvPr id="3" name="Content Placeholder 2"/>
+          <p:cNvSpPr>
+            <a:spLocks noGrp="1"/>
+          </p:cNvSpPr>
+          <p:nvPr>
+            <p:ph idx="1"/>
+          </p:nvPr>
+        </p:nvSpPr>
+        <p:spPr/>
+        <p:txBody>
+          <a:bodyPr/>
+          <a:lstStyle/>
+          <a:p>
+            <a:pPr marL="457200" indent="-457200">
+              <a:buFont typeface="+mj-lt"/>
+              <a:buAutoNum type="arabicPeriod"/>
+            </a:pPr>
+            <a:r>
+              <a:rPr lang="en-US" dirty="0" smtClean="0"/>
+              <a:t>Gather content</a:t>
+            </a:r>
+          </a:p>
+          <a:p>
+            <a:pPr marL="457200" indent="-457200">
+              <a:buFont typeface="+mj-lt"/>
+              <a:buAutoNum type="arabicPeriod"/>
+            </a:pPr>
+            <a:r>
+              <a:rPr lang="en-US" dirty="0" smtClean="0"/>
+              <a:t>Brainstorm a theme and visual metaphor</a:t>
+            </a:r>
+          </a:p>
+          <a:p>
+            <a:pPr marL="457200" indent="-457200">
+              <a:buFont typeface="+mj-lt"/>
+              <a:buAutoNum type="arabicPeriod"/>
+            </a:pPr>
+            <a:r>
+              <a:rPr lang="en-US" dirty="0" smtClean="0"/>
+              <a:t>Develop visual metaphor, layout, color scheme</a:t>
+            </a:r>
+          </a:p>
+          <a:p>
+            <a:pPr marL="457200" indent="-457200">
+              <a:buFont typeface="+mj-lt"/>
+              <a:buAutoNum type="arabicPeriod"/>
+            </a:pPr>
+            <a:r>
+              <a:rPr lang="en-US" dirty="0" smtClean="0"/>
+              <a:t>Build a storyboard on paper</a:t>
+            </a:r>
+          </a:p>
+          <a:p>
+            <a:pPr marL="457200" indent="-457200">
+              <a:buFont typeface="+mj-lt"/>
+              <a:buAutoNum type="arabicPeriod"/>
+            </a:pPr>
+            <a:r>
+              <a:rPr lang="en-US" dirty="0" smtClean="0"/>
+              <a:t>Card sort</a:t>
+            </a:r>
+          </a:p>
+          <a:p>
+            <a:pPr marL="457200" indent="-457200">
+              <a:buFont typeface="+mj-lt"/>
+              <a:buAutoNum type="arabicPeriod"/>
+            </a:pPr>
+            <a:r>
+              <a:rPr lang="en-US" dirty="0" smtClean="0"/>
+              <a:t>Markup your content</a:t>
+            </a:r>
+          </a:p>
+          <a:p>
+            <a:pPr marL="457200" indent="-457200">
+              <a:buFont typeface="+mj-lt"/>
+              <a:buAutoNum type="arabicPeriod"/>
+            </a:pPr>
+            <a:r>
+              <a:rPr lang="en-US" dirty="0" smtClean="0"/>
+              <a:t>Style your content</a:t>
+            </a:r>
+            <a:endParaRPr lang="en-US" dirty="0"/>
+          </a:p>
+        </p:txBody>
+      </p:sp>
+    </p:spTree>
+    <p:extLst>
+      <p:ext uri="{BB962C8B-B14F-4D97-AF65-F5344CB8AC3E}">
+        <p14:creationId xmlns:p14="http://schemas.microsoft.com/office/powerpoint/2010/main" val="1644293927"/>
+      </p:ext>
+    </p:extLst>
+  </p:cSld>
+  <p:clrMapOvr>
+    <a:masterClrMapping/>
+  </p:clrMapOvr>
+</p:sld>
+</file>
+
+<file path=ppt/slides/slide21.xml><?xml version="1.0" encoding="utf-8"?>
+<p:sld xmlns:a="http://schemas.openxmlformats.org/drawingml/2006/main" xmlns:r="http://schemas.openxmlformats.org/officeDocument/2006/relationships" xmlns:p="http://schemas.openxmlformats.org/presentationml/2006/main">
+  <p:cSld>
+    <p:spTree>
+      <p:nvGrpSpPr>
+        <p:cNvPr id="1" name=""/>
+        <p:cNvGrpSpPr/>
+        <p:nvPr/>
+      </p:nvGrpSpPr>
+      <p:grpSpPr>
+        <a:xfrm>
+          <a:off x="0" y="0"/>
+          <a:ext cx="0" cy="0"/>
+          <a:chOff x="0" y="0"/>
+          <a:chExt cx="0" cy="0"/>
+        </a:xfrm>
+      </p:grpSpPr>
+      <p:sp>
+        <p:nvSpPr>
+          <p:cNvPr id="9" name="Title 8"/>
+          <p:cNvSpPr>
+            <a:spLocks noGrp="1"/>
+          </p:cNvSpPr>
+          <p:nvPr>
+            <p:ph type="title"/>
+          </p:nvPr>
+        </p:nvSpPr>
+        <p:spPr/>
+        <p:txBody>
+          <a:bodyPr/>
+          <a:lstStyle/>
+          <a:p>
+            <a:r>
+              <a:rPr lang="en-US" dirty="0" smtClean="0"/>
+              <a:t>Class Seven</a:t>
+            </a:r>
+            <a:endParaRPr lang="en-US" dirty="0"/>
+          </a:p>
+        </p:txBody>
+      </p:sp>
+      <p:sp>
+        <p:nvSpPr>
+          <p:cNvPr id="10" name="Text Placeholder 9"/>
+          <p:cNvSpPr>
+            <a:spLocks noGrp="1"/>
+          </p:cNvSpPr>
+          <p:nvPr>
+            <p:ph type="body" idx="1"/>
+          </p:nvPr>
+        </p:nvSpPr>
+        <p:spPr/>
+        <p:txBody>
+          <a:bodyPr/>
+          <a:lstStyle/>
+          <a:p>
+            <a:r>
+              <a:rPr lang="en-US" dirty="0" smtClean="0"/>
+              <a:t>Layout and Design (Part </a:t>
+            </a:r>
+            <a:r>
+              <a:rPr lang="en-US" dirty="0" smtClean="0"/>
+              <a:t>I</a:t>
+            </a:r>
+            <a:r>
+              <a:rPr lang="en-US" dirty="0" smtClean="0"/>
+              <a:t>)</a:t>
+            </a:r>
+            <a:endParaRPr lang="en-US" dirty="0"/>
+          </a:p>
+        </p:txBody>
+      </p:sp>
+      <p:sp>
+        <p:nvSpPr>
+          <p:cNvPr id="11" name="Footer Placeholder 10"/>
+          <p:cNvSpPr>
+            <a:spLocks noGrp="1"/>
+          </p:cNvSpPr>
+          <p:nvPr>
+            <p:ph type="ftr" sz="quarter" idx="11"/>
+          </p:nvPr>
+        </p:nvSpPr>
+        <p:spPr/>
+        <p:txBody>
+          <a:bodyPr/>
+          <a:lstStyle/>
+          <a:p>
+            <a:r>
+              <a:rPr lang="en-US" dirty="0"/>
+              <a:t>Assignment: </a:t>
+            </a:r>
+            <a:r>
+              <a:rPr lang="en-US" dirty="0"/>
+              <a:t>Read Chapter 4 (pages 109 – 127)</a:t>
+            </a:r>
+            <a:r>
+              <a:rPr lang="en-US" dirty="0" smtClean="0"/>
+              <a:t>,</a:t>
+            </a:r>
+          </a:p>
+          <a:p>
+            <a:r>
+              <a:rPr lang="en-US" dirty="0" smtClean="0"/>
+              <a:t>markup </a:t>
+            </a:r>
+            <a:r>
+              <a:rPr lang="en-US" dirty="0"/>
+              <a:t>your storyboard, part II</a:t>
+            </a:r>
+            <a:endParaRPr lang="en-US" dirty="0"/>
+          </a:p>
+        </p:txBody>
+      </p:sp>
+    </p:spTree>
+    <p:extLst>
+      <p:ext uri="{BB962C8B-B14F-4D97-AF65-F5344CB8AC3E}">
+        <p14:creationId xmlns:p14="http://schemas.microsoft.com/office/powerpoint/2010/main" val="472547524"/>
       </p:ext>
     </p:extLst>
   </p:cSld>
@@ -7736,6 +7914,13 @@
   <p:clrMapOvr>
     <a:masterClrMapping/>
   </p:clrMapOvr>
+  <p:timing>
+    <p:tnLst>
+      <p:par>
+        <p:cTn xmlns:p14="http://schemas.microsoft.com/office/powerpoint/2010/main" id="1" dur="indefinite" restart="never" nodeType="tmRoot"/>
+      </p:par>
+    </p:tnLst>
+  </p:timing>
 </p:sld>
 </file>
 
@@ -7773,8 +7958,97 @@
           <a:p>
             <a:r>
               <a:rPr lang="en-US" dirty="0" smtClean="0"/>
-              <a:t>Quiz Time</a:t>
-            </a:r>
+              <a:t>Class Four Assignment</a:t>
+            </a:r>
+            <a:endParaRPr lang="en-US" dirty="0"/>
+          </a:p>
+        </p:txBody>
+      </p:sp>
+      <p:sp>
+        <p:nvSpPr>
+          <p:cNvPr id="3" name="Content Placeholder 2"/>
+          <p:cNvSpPr>
+            <a:spLocks noGrp="1"/>
+          </p:cNvSpPr>
+          <p:nvPr>
+            <p:ph idx="1"/>
+          </p:nvPr>
+        </p:nvSpPr>
+        <p:spPr/>
+        <p:txBody>
+          <a:bodyPr/>
+          <a:lstStyle/>
+          <a:p>
+            <a:r>
+              <a:rPr lang="en-US" dirty="0" smtClean="0"/>
+              <a:t>What is an HTML tag?</a:t>
+            </a:r>
+          </a:p>
+          <a:p>
+            <a:pPr lvl="1"/>
+            <a:r>
+              <a:rPr lang="en-US" dirty="0" smtClean="0"/>
+              <a:t>I wanted "head"</a:t>
+            </a:r>
+          </a:p>
+          <a:p>
+            <a:pPr lvl="1"/>
+            <a:r>
+              <a:rPr lang="en-US" dirty="0" smtClean="0"/>
+              <a:t>Not "&lt;head </a:t>
+            </a:r>
+            <a:r>
+              <a:rPr lang="en-US" dirty="0" err="1" smtClean="0"/>
+              <a:t>lang</a:t>
+            </a:r>
+            <a:r>
+              <a:rPr lang="en-US" dirty="0" smtClean="0"/>
+              <a:t>="en"&gt;"</a:t>
+            </a:r>
+          </a:p>
+          <a:p>
+            <a:pPr lvl="1"/>
+            <a:r>
+              <a:rPr lang="en-US" dirty="0" smtClean="0"/>
+              <a:t>I also wanted unique</a:t>
+            </a:r>
+          </a:p>
+          <a:p>
+            <a:r>
+              <a:rPr lang="en-US" dirty="0" smtClean="0"/>
+              <a:t>What is a rule?</a:t>
+            </a:r>
+          </a:p>
+          <a:p>
+            <a:pPr lvl="1"/>
+            <a:r>
+              <a:rPr lang="en-US" dirty="0" smtClean="0"/>
+              <a:t>I wanted "font-size: 10px;"</a:t>
+            </a:r>
+          </a:p>
+          <a:p>
+            <a:pPr lvl="1"/>
+            <a:r>
+              <a:rPr lang="en-US" dirty="0" smtClean="0"/>
+              <a:t>Not "font-size"</a:t>
+            </a:r>
+          </a:p>
+          <a:p>
+            <a:pPr lvl="1"/>
+            <a:r>
+              <a:rPr lang="en-US" dirty="0" smtClean="0"/>
+              <a:t>Or "div </a:t>
+            </a:r>
+            <a:r>
+              <a:rPr lang="en-US" dirty="0" err="1" smtClean="0"/>
+              <a:t>ul</a:t>
+            </a:r>
+            <a:r>
+              <a:rPr lang="en-US" dirty="0" smtClean="0"/>
+              <a:t> { font-size: 10px; }"</a:t>
+            </a:r>
+          </a:p>
+          <a:p>
             <a:endParaRPr lang="en-US" dirty="0"/>
           </a:p>
         </p:txBody>
@@ -7782,7 +8056,7 @@
     </p:spTree>
     <p:extLst>
       <p:ext uri="{BB962C8B-B14F-4D97-AF65-F5344CB8AC3E}">
-        <p14:creationId xmlns:p14="http://schemas.microsoft.com/office/powerpoint/2010/main" val="2813428287"/>
+        <p14:creationId xmlns:p14="http://schemas.microsoft.com/office/powerpoint/2010/main" val="2998477915"/>
       </p:ext>
     </p:extLst>
   </p:cSld>
@@ -7833,7 +8107,7 @@
           <a:p>
             <a:r>
               <a:rPr lang="en-US" dirty="0" smtClean="0"/>
-              <a:t>Website Autopsy</a:t>
+              <a:t>Validate</a:t>
             </a:r>
             <a:endParaRPr lang="en-US" dirty="0"/>
           </a:p>
@@ -7851,11 +8125,32 @@
         </p:nvSpPr>
         <p:spPr/>
         <p:txBody>
-          <a:bodyPr>
-            <a:normAutofit/>
-          </a:bodyPr>
-          <a:lstStyle/>
-          <a:p>
+          <a:bodyPr/>
+          <a:lstStyle/>
+          <a:p>
+            <a:r>
+              <a:rPr lang="en-US" dirty="0" smtClean="0"/>
+              <a:t>Validate HTML: </a:t>
+            </a:r>
+            <a:r>
+              <a:rPr lang="en-US" dirty="0" smtClean="0">
+                <a:hlinkClick r:id="rId2"/>
+              </a:rPr>
+              <a:t>http://validator.w3.org/</a:t>
+            </a:r>
+            <a:endParaRPr lang="en-US" dirty="0" smtClean="0"/>
+          </a:p>
+          <a:p>
+            <a:r>
+              <a:rPr lang="en-US" dirty="0" smtClean="0"/>
+              <a:t>Validate CSS: </a:t>
+            </a:r>
+            <a:r>
+              <a:rPr lang="en-US" dirty="0" smtClean="0">
+                <a:hlinkClick r:id="rId3"/>
+              </a:rPr>
+              <a:t>http://jigsaw.w3.org/css-validator/</a:t>
+            </a:r>
             <a:endParaRPr lang="en-US" dirty="0"/>
           </a:p>
         </p:txBody>
@@ -7863,7 +8158,7 @@
     </p:spTree>
     <p:extLst>
       <p:ext uri="{BB962C8B-B14F-4D97-AF65-F5344CB8AC3E}">
-        <p14:creationId xmlns:p14="http://schemas.microsoft.com/office/powerpoint/2010/main" val="2577880583"/>
+        <p14:creationId xmlns:p14="http://schemas.microsoft.com/office/powerpoint/2010/main" val="492113910"/>
       </p:ext>
     </p:extLst>
   </p:cSld>
@@ -7899,7 +8194,7 @@
       </p:grpSpPr>
       <p:sp>
         <p:nvSpPr>
-          <p:cNvPr id="3" name="Title 2"/>
+          <p:cNvPr id="2" name="Title 1"/>
           <p:cNvSpPr>
             <a:spLocks noGrp="1"/>
           </p:cNvSpPr>
@@ -7914,35 +8209,16 @@
           <a:p>
             <a:r>
               <a:rPr lang="en-US" dirty="0" smtClean="0"/>
-              <a:t>Break</a:t>
+              <a:t>Quiz Time</a:t>
             </a:r>
             <a:endParaRPr lang="en-US" dirty="0"/>
-          </a:p>
-        </p:txBody>
-      </p:sp>
-      <p:sp>
-        <p:nvSpPr>
-          <p:cNvPr id="4" name="Text Placeholder 3"/>
-          <p:cNvSpPr>
-            <a:spLocks noGrp="1"/>
-          </p:cNvSpPr>
-          <p:nvPr>
-            <p:ph type="body" idx="1"/>
-          </p:nvPr>
-        </p:nvSpPr>
-        <p:spPr/>
-        <p:txBody>
-          <a:bodyPr/>
-          <a:lstStyle/>
-          <a:p>
-            <a:endParaRPr lang="en-US"/>
           </a:p>
         </p:txBody>
       </p:sp>
     </p:spTree>
     <p:extLst>
       <p:ext uri="{BB962C8B-B14F-4D97-AF65-F5344CB8AC3E}">
-        <p14:creationId xmlns:p14="http://schemas.microsoft.com/office/powerpoint/2010/main" val="3610379708"/>
+        <p14:creationId xmlns:p14="http://schemas.microsoft.com/office/powerpoint/2010/main" val="2813428287"/>
       </p:ext>
     </p:extLst>
   </p:cSld>
@@ -7978,7 +8254,7 @@
       </p:grpSpPr>
       <p:sp>
         <p:nvSpPr>
-          <p:cNvPr id="4" name="Title 3"/>
+          <p:cNvPr id="2" name="Title 1"/>
           <p:cNvSpPr>
             <a:spLocks noGrp="1"/>
           </p:cNvSpPr>
@@ -7993,7 +8269,7 @@
           <a:p>
             <a:r>
               <a:rPr lang="en-US" dirty="0" smtClean="0"/>
-              <a:t>Frameworks</a:t>
+              <a:t>Website Autopsy</a:t>
             </a:r>
             <a:endParaRPr lang="en-US" dirty="0"/>
           </a:p>
@@ -8001,7 +8277,7 @@
       </p:sp>
       <p:sp>
         <p:nvSpPr>
-          <p:cNvPr id="7" name="Content Placeholder 6"/>
+          <p:cNvPr id="3" name="Content Placeholder 2"/>
           <p:cNvSpPr>
             <a:spLocks noGrp="1"/>
           </p:cNvSpPr>
@@ -8011,23 +8287,83 @@
         </p:nvSpPr>
         <p:spPr/>
         <p:txBody>
-          <a:bodyPr/>
-          <a:lstStyle/>
-          <a:p>
-            <a:endParaRPr lang="en-US"/>
+          <a:bodyPr>
+            <a:normAutofit/>
+          </a:bodyPr>
+          <a:lstStyle/>
+          <a:p>
+            <a:r>
+              <a:rPr lang="en-US" dirty="0" smtClean="0">
+                <a:hlinkClick r:id="rId3"/>
+              </a:rPr>
+              <a:t>http://theovenreinvented.com/</a:t>
+            </a:r>
+            <a:endParaRPr lang="en-US" dirty="0" smtClean="0"/>
+          </a:p>
+          <a:p>
+            <a:r>
+              <a:rPr lang="en-US" dirty="0" smtClean="0">
+                <a:hlinkClick r:id="rId4"/>
+              </a:rPr>
+              <a:t>http://www.imdb.com/</a:t>
+            </a:r>
+            <a:endParaRPr lang="en-US" dirty="0" smtClean="0"/>
+          </a:p>
+          <a:p>
+            <a:r>
+              <a:rPr lang="en-US" dirty="0" smtClean="0">
+                <a:hlinkClick r:id="rId5"/>
+              </a:rPr>
+              <a:t>http://www.dealchicken.com/sioux-falls-sd</a:t>
+            </a:r>
+            <a:endParaRPr lang="en-US" dirty="0" smtClean="0"/>
+          </a:p>
+          <a:p>
+            <a:r>
+              <a:rPr lang="en-US" dirty="0" smtClean="0">
+                <a:hlinkClick r:id="rId6"/>
+              </a:rPr>
+              <a:t>http://www.nbc.com/</a:t>
+            </a:r>
+            <a:endParaRPr lang="en-US" dirty="0" smtClean="0"/>
+          </a:p>
+          <a:p>
+            <a:r>
+              <a:rPr lang="en-US" dirty="0" smtClean="0">
+                <a:hlinkClick r:id="rId7"/>
+              </a:rPr>
+              <a:t>http://www.uggaustralia.com/sheepskin-boots/women-boots-classic,default,sc.html</a:t>
+            </a:r>
+            <a:endParaRPr lang="en-US" dirty="0" smtClean="0"/>
+          </a:p>
+          <a:p>
+            <a:r>
+              <a:rPr lang="en-US" dirty="0" smtClean="0">
+                <a:hlinkClick r:id="rId8"/>
+              </a:rPr>
+              <a:t>http://www.ourfavoritewebsites.com/</a:t>
+            </a:r>
+            <a:endParaRPr lang="en-US" dirty="0"/>
           </a:p>
         </p:txBody>
       </p:sp>
     </p:spTree>
     <p:extLst>
       <p:ext uri="{BB962C8B-B14F-4D97-AF65-F5344CB8AC3E}">
-        <p14:creationId xmlns:p14="http://schemas.microsoft.com/office/powerpoint/2010/main" val="2907954962"/>
+        <p14:creationId xmlns:p14="http://schemas.microsoft.com/office/powerpoint/2010/main" val="2577880583"/>
       </p:ext>
     </p:extLst>
   </p:cSld>
   <p:clrMapOvr>
     <a:masterClrMapping/>
   </p:clrMapOvr>
+  <p:timing>
+    <p:tnLst>
+      <p:par>
+        <p:cTn xmlns:p14="http://schemas.microsoft.com/office/powerpoint/2010/main" id="1" dur="indefinite" restart="never" nodeType="tmRoot"/>
+      </p:par>
+    </p:tnLst>
+  </p:timing>
 </p:sld>
 </file>
 
@@ -8050,7 +8386,7 @@
       </p:grpSpPr>
       <p:sp>
         <p:nvSpPr>
-          <p:cNvPr id="2" name="Title 1"/>
+          <p:cNvPr id="3" name="Title 2"/>
           <p:cNvSpPr>
             <a:spLocks noGrp="1"/>
           </p:cNvSpPr>
@@ -8065,7 +8401,7 @@
           <a:p>
             <a:r>
               <a:rPr lang="en-US" dirty="0" smtClean="0"/>
-              <a:t>What is a framework?</a:t>
+              <a:t>Break</a:t>
             </a:r>
             <a:endParaRPr lang="en-US" dirty="0"/>
           </a:p>
@@ -8073,61 +8409,40 @@
       </p:sp>
       <p:sp>
         <p:nvSpPr>
-          <p:cNvPr id="3" name="Content Placeholder 2"/>
-          <p:cNvSpPr>
-            <a:spLocks noGrp="1"/>
-          </p:cNvSpPr>
-          <p:nvPr>
-            <p:ph idx="1"/>
-          </p:nvPr>
-        </p:nvSpPr>
-        <p:spPr/>
-        <p:txBody>
-          <a:bodyPr/>
-          <a:lstStyle/>
-          <a:p>
-            <a:r>
-              <a:rPr lang="en-US" dirty="0" smtClean="0"/>
-              <a:t>A tool that makes writing code easier</a:t>
-            </a:r>
-          </a:p>
-          <a:p>
-            <a:r>
-              <a:rPr lang="en-US" dirty="0" smtClean="0"/>
-              <a:t>Frameworks are available for all languages</a:t>
-            </a:r>
-          </a:p>
-          <a:p>
-            <a:r>
-              <a:rPr lang="en-US" dirty="0" smtClean="0"/>
-              <a:t>Can add new features</a:t>
-            </a:r>
-          </a:p>
-          <a:p>
-            <a:r>
-              <a:rPr lang="en-US" dirty="0" smtClean="0"/>
-              <a:t>Can fix bugs or strange behavior</a:t>
-            </a:r>
-          </a:p>
-          <a:p>
-            <a:r>
-              <a:rPr lang="en-US" dirty="0" smtClean="0"/>
-              <a:t>Can make it into a whole new language</a:t>
-            </a:r>
-            <a:endParaRPr lang="en-US" dirty="0"/>
+          <p:cNvPr id="4" name="Text Placeholder 3"/>
+          <p:cNvSpPr>
+            <a:spLocks noGrp="1"/>
+          </p:cNvSpPr>
+          <p:nvPr>
+            <p:ph type="body" idx="1"/>
+          </p:nvPr>
+        </p:nvSpPr>
+        <p:spPr/>
+        <p:txBody>
+          <a:bodyPr/>
+          <a:lstStyle/>
+          <a:p>
+            <a:endParaRPr lang="en-US"/>
           </a:p>
         </p:txBody>
       </p:sp>
     </p:spTree>
     <p:extLst>
       <p:ext uri="{BB962C8B-B14F-4D97-AF65-F5344CB8AC3E}">
-        <p14:creationId xmlns:p14="http://schemas.microsoft.com/office/powerpoint/2010/main" val="1077609855"/>
+        <p14:creationId xmlns:p14="http://schemas.microsoft.com/office/powerpoint/2010/main" val="3610379708"/>
       </p:ext>
     </p:extLst>
   </p:cSld>
   <p:clrMapOvr>
     <a:masterClrMapping/>
   </p:clrMapOvr>
+  <p:timing>
+    <p:tnLst>
+      <p:par>
+        <p:cTn xmlns:p14="http://schemas.microsoft.com/office/powerpoint/2010/main" id="1" dur="indefinite" restart="never" nodeType="tmRoot"/>
+      </p:par>
+    </p:tnLst>
+  </p:timing>
 </p:sld>
 </file>
 
@@ -8150,7 +8465,7 @@
       </p:grpSpPr>
       <p:sp>
         <p:nvSpPr>
-          <p:cNvPr id="2" name="Title 1"/>
+          <p:cNvPr id="4" name="Title 3"/>
           <p:cNvSpPr>
             <a:spLocks noGrp="1"/>
           </p:cNvSpPr>
@@ -8165,7 +8480,7 @@
           <a:p>
             <a:r>
               <a:rPr lang="en-US" dirty="0" smtClean="0"/>
-              <a:t>CSS Frameworks</a:t>
+              <a:t>Frameworks</a:t>
             </a:r>
             <a:endParaRPr lang="en-US" dirty="0"/>
           </a:p>
@@ -8173,7 +8488,7 @@
       </p:sp>
       <p:sp>
         <p:nvSpPr>
-          <p:cNvPr id="3" name="Content Placeholder 2"/>
+          <p:cNvPr id="7" name="Content Placeholder 6"/>
           <p:cNvSpPr>
             <a:spLocks noGrp="1"/>
           </p:cNvSpPr>
@@ -8186,47 +8501,27 @@
           <a:bodyPr/>
           <a:lstStyle/>
           <a:p>
-            <a:r>
-              <a:rPr lang="en-US" dirty="0" smtClean="0"/>
-              <a:t>Fix browser differences</a:t>
-            </a:r>
-          </a:p>
-          <a:p>
-            <a:r>
-              <a:rPr lang="en-US" dirty="0" smtClean="0"/>
-              <a:t>Better layout control</a:t>
-            </a:r>
-          </a:p>
-          <a:p>
-            <a:r>
-              <a:rPr lang="en-US" dirty="0" smtClean="0"/>
-              <a:t>Typography</a:t>
-            </a:r>
-          </a:p>
-          <a:p>
-            <a:r>
-              <a:rPr lang="en-US" dirty="0" smtClean="0"/>
-              <a:t>Form styling</a:t>
-            </a:r>
-          </a:p>
-          <a:p>
-            <a:r>
-              <a:rPr lang="en-US" dirty="0" smtClean="0"/>
-              <a:t>Print styles</a:t>
-            </a:r>
+            <a:endParaRPr lang="en-US"/>
           </a:p>
         </p:txBody>
       </p:sp>
     </p:spTree>
     <p:extLst>
       <p:ext uri="{BB962C8B-B14F-4D97-AF65-F5344CB8AC3E}">
-        <p14:creationId xmlns:p14="http://schemas.microsoft.com/office/powerpoint/2010/main" val="1773065251"/>
+        <p14:creationId xmlns:p14="http://schemas.microsoft.com/office/powerpoint/2010/main" val="2907954962"/>
       </p:ext>
     </p:extLst>
   </p:cSld>
   <p:clrMapOvr>
     <a:masterClrMapping/>
   </p:clrMapOvr>
+  <p:timing>
+    <p:tnLst>
+      <p:par>
+        <p:cTn xmlns:p14="http://schemas.microsoft.com/office/powerpoint/2010/main" id="1" dur="indefinite" restart="never" nodeType="tmRoot"/>
+      </p:par>
+    </p:tnLst>
+  </p:timing>
 </p:sld>
 </file>
 

</xml_diff>